<commit_message>
ppt cloud computing SLA revisado 30032023
</commit_message>
<xml_diff>
--- a/01 Classes/Aula 05 - Computação em Nuvem e Web Services em Linux Bilhetagem.pptx
+++ b/01 Classes/Aula 05 - Computação em Nuvem e Web Services em Linux Bilhetagem.pptx
@@ -6809,21 +6809,21 @@
               <a:buNone/>
             </a:pPr>
             <a:r>
-              <a:rPr lang="pt-BR" sz="2400" dirty="0">
+              <a:rPr lang="pt-BR" sz="2000" dirty="0">
                 <a:solidFill>
                   <a:schemeClr val="tx1"/>
                 </a:solidFill>
                 <a:latin typeface="Times" panose="02020603050405020304" pitchFamily="18" charset="0"/>
                 <a:cs typeface="Times" panose="02020603050405020304" pitchFamily="18" charset="0"/>
               </a:rPr>
-              <a:t>Os Contratos de Nível de Serviço (SLA) descrevem os compromissos da Microsoft para tempo de atividade e conectividade para Microsoft Online Services. </a:t>
+              <a:t>Os Contratos de Nível de Serviço (SLA) descrevem os compromissos da Microsoft para tempo de atividade e conectividade para Microsoft Online Services.</a:t>
             </a:r>
           </a:p>
           <a:p>
             <a:pPr marL="0" indent="0" algn="just">
               <a:buNone/>
             </a:pPr>
-            <a:endParaRPr lang="pt-BR" sz="2400" dirty="0">
+            <a:endParaRPr lang="pt-BR" sz="2000" dirty="0">
               <a:solidFill>
                 <a:schemeClr val="tx1"/>
               </a:solidFill>
@@ -6836,7 +6836,7 @@
               <a:buNone/>
             </a:pPr>
             <a:r>
-              <a:rPr lang="pt-BR" sz="2400" dirty="0">
+              <a:rPr lang="pt-BR" sz="2000" dirty="0">
                 <a:solidFill>
                   <a:schemeClr val="tx1"/>
                 </a:solidFill>
@@ -6846,7 +6846,7 @@
               <a:t>As edições atuais e arquivadas do SLA estão disponíveis para download e abrangem Azure, Dynamics 365, Office 365 e </a:t>
             </a:r>
             <a:r>
-              <a:rPr lang="pt-BR" sz="2400" dirty="0" err="1">
+              <a:rPr lang="pt-BR" sz="2000" dirty="0" err="1">
                 <a:solidFill>
                   <a:schemeClr val="tx1"/>
                 </a:solidFill>
@@ -6856,7 +6856,7 @@
               <a:t>Intune</a:t>
             </a:r>
             <a:r>
-              <a:rPr lang="pt-BR" sz="2400" dirty="0">
+              <a:rPr lang="pt-BR" sz="2000" dirty="0">
                 <a:solidFill>
                   <a:schemeClr val="tx1"/>
                 </a:solidFill>
@@ -6870,7 +6870,31 @@
             <a:pPr marL="0" indent="0" algn="just">
               <a:buNone/>
             </a:pPr>
-            <a:endParaRPr lang="pt-BR" sz="2400" dirty="0">
+            <a:endParaRPr lang="pt-BR" sz="2000" dirty="0">
+              <a:solidFill>
+                <a:schemeClr val="tx1"/>
+              </a:solidFill>
+              <a:latin typeface="Times" panose="02020603050405020304" pitchFamily="18" charset="0"/>
+              <a:cs typeface="Times" panose="02020603050405020304" pitchFamily="18" charset="0"/>
+              <a:hlinkClick r:id="rId3"/>
+            </a:endParaRPr>
+          </a:p>
+          <a:p>
+            <a:pPr marL="0" indent="0" algn="just">
+              <a:buNone/>
+            </a:pPr>
+            <a:r>
+              <a:rPr lang="pt-BR" sz="2000" dirty="0">
+                <a:solidFill>
+                  <a:schemeClr val="tx1"/>
+                </a:solidFill>
+                <a:latin typeface="Times" panose="02020603050405020304" pitchFamily="18" charset="0"/>
+                <a:cs typeface="Times" panose="02020603050405020304" pitchFamily="18" charset="0"/>
+                <a:hlinkClick r:id="rId3"/>
+              </a:rPr>
+              <a:t>https://learn.microsoft.com/pt-br/training/modules/choose-azure-services-sla-lifecycle/</a:t>
+            </a:r>
+            <a:endParaRPr lang="pt-BR" sz="2000" dirty="0">
               <a:solidFill>
                 <a:schemeClr val="tx1"/>
               </a:solidFill>
@@ -6882,18 +6906,42 @@
             <a:pPr marL="0" indent="0" algn="just">
               <a:buNone/>
             </a:pPr>
-            <a:r>
-              <a:rPr lang="pt-BR" sz="2400" dirty="0">
+            <a:endParaRPr lang="pt-BR" sz="2000">
+              <a:solidFill>
+                <a:schemeClr val="tx1"/>
+              </a:solidFill>
+              <a:latin typeface="Times" panose="02020603050405020304" pitchFamily="18" charset="0"/>
+              <a:cs typeface="Times" panose="02020603050405020304" pitchFamily="18" charset="0"/>
+              <a:hlinkClick r:id="rId4"/>
+            </a:endParaRPr>
+          </a:p>
+          <a:p>
+            <a:pPr marL="0" indent="0" algn="just">
+              <a:buNone/>
+            </a:pPr>
+            <a:r>
+              <a:rPr lang="pt-BR" sz="2000">
                 <a:solidFill>
                   <a:schemeClr val="tx1"/>
                 </a:solidFill>
                 <a:latin typeface="Times" panose="02020603050405020304" pitchFamily="18" charset="0"/>
                 <a:cs typeface="Times" panose="02020603050405020304" pitchFamily="18" charset="0"/>
-                <a:hlinkClick r:id="rId3"/>
-              </a:rPr>
-              <a:t>https://learn.microsoft.com/pt-br/training/modules/choose-azure-services-sla-lifecycle/</a:t>
-            </a:r>
-            <a:endParaRPr lang="pt-BR" sz="2400" dirty="0">
+                <a:hlinkClick r:id="rId4"/>
+              </a:rPr>
+              <a:t>https</a:t>
+            </a:r>
+            <a:r>
+              <a:rPr lang="pt-BR" sz="2000" dirty="0">
+                <a:solidFill>
+                  <a:schemeClr val="tx1"/>
+                </a:solidFill>
+                <a:latin typeface="Times" panose="02020603050405020304" pitchFamily="18" charset="0"/>
+                <a:cs typeface="Times" panose="02020603050405020304" pitchFamily="18" charset="0"/>
+                <a:hlinkClick r:id="rId4"/>
+              </a:rPr>
+              <a:t>://azure.microsoft.com/pt-br/pricing/details/virtual-machines/windows/#pricing</a:t>
+            </a:r>
+            <a:endParaRPr lang="pt-BR" sz="2000" dirty="0">
               <a:solidFill>
                 <a:schemeClr val="tx1"/>
               </a:solidFill>
@@ -8204,8 +8252,58 @@
                 <a:latin typeface="Times New Roman" panose="02020603050405020304" pitchFamily="18" charset="0"/>
                 <a:cs typeface="Times New Roman" panose="02020603050405020304" pitchFamily="18" charset="0"/>
               </a:rPr>
-              <a:t>e através de uma IDE ou aplicação acessar os dados do BD;</a:t>
-            </a:r>
+              <a:t>e através de uma IDE ou aplicação acessar os dados do BD; </a:t>
+            </a:r>
+            <a:r>
+              <a:rPr lang="pt-BR" sz="2000" dirty="0">
+                <a:latin typeface="Times New Roman" panose="02020603050405020304" pitchFamily="18" charset="0"/>
+                <a:cs typeface="Times New Roman" panose="02020603050405020304" pitchFamily="18" charset="0"/>
+                <a:hlinkClick r:id="rId3"/>
+              </a:rPr>
+              <a:t>https://www.mongodb.com/</a:t>
+            </a:r>
+            <a:endParaRPr lang="pt-BR" sz="2000" dirty="0">
+              <a:latin typeface="Times New Roman" panose="02020603050405020304" pitchFamily="18" charset="0"/>
+              <a:cs typeface="Times New Roman" panose="02020603050405020304" pitchFamily="18" charset="0"/>
+            </a:endParaRPr>
+          </a:p>
+          <a:p>
+            <a:pPr marL="0" indent="0" algn="just">
+              <a:buNone/>
+            </a:pPr>
+            <a:r>
+              <a:rPr lang="pt-BR" sz="2000" dirty="0">
+                <a:latin typeface="Times New Roman" panose="02020603050405020304" pitchFamily="18" charset="0"/>
+                <a:cs typeface="Times New Roman" panose="02020603050405020304" pitchFamily="18" charset="0"/>
+              </a:rPr>
+              <a:t>     </a:t>
+            </a:r>
+            <a:r>
+              <a:rPr lang="pt-BR" sz="2000" b="1" dirty="0">
+                <a:latin typeface="Times New Roman" panose="02020603050405020304" pitchFamily="18" charset="0"/>
+                <a:cs typeface="Times New Roman" panose="02020603050405020304" pitchFamily="18" charset="0"/>
+              </a:rPr>
+              <a:t>IDE</a:t>
+            </a:r>
+            <a:r>
+              <a:rPr lang="pt-BR" sz="2000" dirty="0">
+                <a:latin typeface="Times New Roman" panose="02020603050405020304" pitchFamily="18" charset="0"/>
+                <a:cs typeface="Times New Roman" panose="02020603050405020304" pitchFamily="18" charset="0"/>
+              </a:rPr>
+              <a:t>: </a:t>
+            </a:r>
+            <a:r>
+              <a:rPr lang="pt-BR" sz="2000" dirty="0">
+                <a:latin typeface="Times New Roman" panose="02020603050405020304" pitchFamily="18" charset="0"/>
+                <a:cs typeface="Times New Roman" panose="02020603050405020304" pitchFamily="18" charset="0"/>
+                <a:hlinkClick r:id="rId4"/>
+              </a:rPr>
+              <a:t>https://jhonathanribeiro.netlify.app/conhe%C3%A7a-4-ferramentas-gratuitas-para-gerenciar-o-mongodb/</a:t>
+            </a:r>
+            <a:endParaRPr lang="pt-BR" sz="2000" dirty="0">
+              <a:latin typeface="Times New Roman" panose="02020603050405020304" pitchFamily="18" charset="0"/>
+              <a:cs typeface="Times New Roman" panose="02020603050405020304" pitchFamily="18" charset="0"/>
+            </a:endParaRPr>
           </a:p>
           <a:p>
             <a:pPr algn="just">
@@ -8310,6 +8408,9 @@
             </a:pPr>
             <a:r>
               <a:rPr lang="pt-BR" sz="2000" b="1" dirty="0">
+                <a:solidFill>
+                  <a:srgbClr val="FF0000"/>
+                </a:solidFill>
                 <a:latin typeface="Calibri" panose="020F0502020204030204" pitchFamily="34" charset="0"/>
               </a:rPr>
               <a:t>Nota</a:t>
@@ -8318,18 +8419,14 @@
               <a:rPr lang="pt-BR" sz="2000" dirty="0">
                 <a:latin typeface="Calibri" panose="020F0502020204030204" pitchFamily="34" charset="0"/>
               </a:rPr>
-              <a:t>: </a:t>
-            </a:r>
-          </a:p>
-          <a:p>
-            <a:pPr marL="0" indent="0" algn="just">
-              <a:buNone/>
-            </a:pPr>
-            <a:endParaRPr lang="pt-BR" sz="1800" dirty="0">
-              <a:latin typeface="Times New Roman" panose="02020603050405020304" pitchFamily="18" charset="0"/>
-              <a:cs typeface="Times New Roman" panose="02020603050405020304" pitchFamily="18" charset="0"/>
-              <a:hlinkClick r:id="rId3"/>
-            </a:endParaRPr>
+              <a:t>: Material para </a:t>
+            </a:r>
+            <a:r>
+              <a:rPr lang="pt-BR" sz="2000" b="1" dirty="0">
+                <a:latin typeface="Calibri" panose="020F0502020204030204" pitchFamily="34" charset="0"/>
+              </a:rPr>
+              <a:t>Podcast</a:t>
+            </a:r>
           </a:p>
           <a:p>
             <a:pPr marL="0" indent="0" algn="just">
@@ -8339,7 +8436,7 @@
               <a:rPr lang="pt-BR" sz="1800" dirty="0">
                 <a:latin typeface="Times New Roman" panose="02020603050405020304" pitchFamily="18" charset="0"/>
                 <a:cs typeface="Times New Roman" panose="02020603050405020304" pitchFamily="18" charset="0"/>
-                <a:hlinkClick r:id="rId3"/>
+                <a:hlinkClick r:id="rId5"/>
               </a:rPr>
               <a:t>https://resultadosdigitais.com.br/marketing/como-criar-um-podcast/#:~:text=Para%20criar%20um%20podcast%20%C3%A9,podcast%20e%20plataformas%20de%20streaming</a:t>
             </a:r>
@@ -9513,7 +9610,7 @@
                 <a:latin typeface="Times New Roman" panose="02020603050405020304" pitchFamily="18" charset="0"/>
                 <a:cs typeface="Times New Roman" panose="02020603050405020304" pitchFamily="18" charset="0"/>
               </a:rPr>
-              <a:t> ou até mesmo recursos de aplicação, com exceção a configurações de usuário específicas e limitadas;</a:t>
+              <a:t> ou até mesmo recursos de aplicação, com exceção das configurações de usuário específicas e limitadas;</a:t>
             </a:r>
           </a:p>
         </p:txBody>

</xml_diff>